<commit_message>
Excepciones y cambio en ppt
</commit_message>
<xml_diff>
--- a/Presentación MultiThreads.pptx
+++ b/Presentación MultiThreads.pptx
@@ -9,6 +9,7 @@
     <p:sldId id="257" r:id="rId3"/>
     <p:sldId id="259" r:id="rId4"/>
     <p:sldId id="258" r:id="rId5"/>
+    <p:sldId id="260" r:id="rId6"/>
   </p:sldIdLst>
   <p:sldSz cx="12192000" cy="6858000"/>
   <p:notesSz cx="6858000" cy="9144000"/>
@@ -118,7 +119,7 @@
 <file path=ppt/revisionInfo.xml><?xml version="1.0" encoding="utf-8"?>
 <p1510:revInfo xmlns:a="http://schemas.openxmlformats.org/drawingml/2006/main" xmlns:r="http://schemas.openxmlformats.org/officeDocument/2006/relationships" xmlns:p1510="http://schemas.microsoft.com/office/powerpoint/2015/10/main">
   <p1510:revLst>
-    <p1510:client id="{DE8E6EAE-F6CD-4785-A600-D922DB218087}" v="7" dt="2020-06-03T12:36:23.758"/>
+    <p1510:client id="{DE8E6EAE-F6CD-4785-A600-D922DB218087}" v="8" dt="2020-06-03T16:06:38.689"/>
   </p1510:revLst>
 </p1510:revInfo>
 </file>
@@ -128,7 +129,7 @@
   <pc:docChgLst>
     <pc:chgData name="Gaston Abalde" userId="c6fa59824ab3963e" providerId="LiveId" clId="{DE8E6EAE-F6CD-4785-A600-D922DB218087}"/>
     <pc:docChg chg="custSel addSld delSld modSld">
-      <pc:chgData name="Gaston Abalde" userId="c6fa59824ab3963e" providerId="LiveId" clId="{DE8E6EAE-F6CD-4785-A600-D922DB218087}" dt="2020-06-03T12:36:26.779" v="366" actId="2696"/>
+      <pc:chgData name="Gaston Abalde" userId="c6fa59824ab3963e" providerId="LiveId" clId="{DE8E6EAE-F6CD-4785-A600-D922DB218087}" dt="2020-06-03T16:07:35.724" v="503" actId="20577"/>
       <pc:docMkLst>
         <pc:docMk/>
       </pc:docMkLst>
@@ -156,7 +157,7 @@
         </pc:spChg>
       </pc:sldChg>
       <pc:sldChg chg="modSp add">
-        <pc:chgData name="Gaston Abalde" userId="c6fa59824ab3963e" providerId="LiveId" clId="{DE8E6EAE-F6CD-4785-A600-D922DB218087}" dt="2020-06-02T19:34:13.966" v="184" actId="20577"/>
+        <pc:chgData name="Gaston Abalde" userId="c6fa59824ab3963e" providerId="LiveId" clId="{DE8E6EAE-F6CD-4785-A600-D922DB218087}" dt="2020-06-03T16:06:04.204" v="376" actId="20577"/>
         <pc:sldMkLst>
           <pc:docMk/>
           <pc:sldMk cId="1471657919" sldId="257"/>
@@ -170,7 +171,7 @@
           </ac:spMkLst>
         </pc:spChg>
         <pc:spChg chg="mod">
-          <ac:chgData name="Gaston Abalde" userId="c6fa59824ab3963e" providerId="LiveId" clId="{DE8E6EAE-F6CD-4785-A600-D922DB218087}" dt="2020-06-02T19:34:13.966" v="184" actId="20577"/>
+          <ac:chgData name="Gaston Abalde" userId="c6fa59824ab3963e" providerId="LiveId" clId="{DE8E6EAE-F6CD-4785-A600-D922DB218087}" dt="2020-06-03T16:06:04.204" v="376" actId="20577"/>
           <ac:spMkLst>
             <pc:docMk/>
             <pc:sldMk cId="1471657919" sldId="257"/>
@@ -237,6 +238,29 @@
             <pc:docMk/>
             <pc:sldMk cId="1466474985" sldId="259"/>
             <ac:spMk id="3" creationId="{122C8338-5127-48ED-8497-D0FF74D40848}"/>
+          </ac:spMkLst>
+        </pc:spChg>
+      </pc:sldChg>
+      <pc:sldChg chg="modSp add">
+        <pc:chgData name="Gaston Abalde" userId="c6fa59824ab3963e" providerId="LiveId" clId="{DE8E6EAE-F6CD-4785-A600-D922DB218087}" dt="2020-06-03T16:07:35.724" v="503" actId="20577"/>
+        <pc:sldMkLst>
+          <pc:docMk/>
+          <pc:sldMk cId="1738228909" sldId="260"/>
+        </pc:sldMkLst>
+        <pc:spChg chg="mod">
+          <ac:chgData name="Gaston Abalde" userId="c6fa59824ab3963e" providerId="LiveId" clId="{DE8E6EAE-F6CD-4785-A600-D922DB218087}" dt="2020-06-03T16:06:45.863" v="397" actId="20577"/>
+          <ac:spMkLst>
+            <pc:docMk/>
+            <pc:sldMk cId="1738228909" sldId="260"/>
+            <ac:spMk id="2" creationId="{7507490D-5BDD-4618-A1A6-D7FAB932AB52}"/>
+          </ac:spMkLst>
+        </pc:spChg>
+        <pc:spChg chg="mod">
+          <ac:chgData name="Gaston Abalde" userId="c6fa59824ab3963e" providerId="LiveId" clId="{DE8E6EAE-F6CD-4785-A600-D922DB218087}" dt="2020-06-03T16:07:35.724" v="503" actId="20577"/>
+          <ac:spMkLst>
+            <pc:docMk/>
+            <pc:sldMk cId="1738228909" sldId="260"/>
+            <ac:spMk id="3" creationId="{72779C6A-3244-44BA-96D6-151D68706649}"/>
           </ac:spMkLst>
         </pc:spChg>
       </pc:sldChg>
@@ -3630,7 +3654,7 @@
           <a:p>
             <a:r>
               <a:rPr lang="es-AR"/>
-              <a:t>Los archivos se leen y escriben en paralelo dentro de una base de datos</a:t>
+              <a:t>Los archivos se leen y escriben en paralelo dentro de una base de datos en tablas</a:t>
             </a:r>
           </a:p>
         </p:txBody>
@@ -3851,6 +3875,119 @@
     <p:extLst>
       <p:ext uri="{BB962C8B-B14F-4D97-AF65-F5344CB8AC3E}">
         <p14:creationId xmlns:p14="http://schemas.microsoft.com/office/powerpoint/2010/main" val="3473457372"/>
+      </p:ext>
+    </p:extLst>
+  </p:cSld>
+  <p:clrMapOvr>
+    <a:masterClrMapping/>
+  </p:clrMapOvr>
+</p:sld>
+</file>
+
+<file path=ppt/slides/slide5.xml><?xml version="1.0" encoding="utf-8"?>
+<p:sld xmlns:a="http://schemas.openxmlformats.org/drawingml/2006/main" xmlns:r="http://schemas.openxmlformats.org/officeDocument/2006/relationships" xmlns:p="http://schemas.openxmlformats.org/presentationml/2006/main">
+  <p:cSld>
+    <p:spTree>
+      <p:nvGrpSpPr>
+        <p:cNvPr id="1" name=""/>
+        <p:cNvGrpSpPr/>
+        <p:nvPr/>
+      </p:nvGrpSpPr>
+      <p:grpSpPr>
+        <a:xfrm>
+          <a:off x="0" y="0"/>
+          <a:ext cx="0" cy="0"/>
+          <a:chOff x="0" y="0"/>
+          <a:chExt cx="0" cy="0"/>
+        </a:xfrm>
+      </p:grpSpPr>
+      <p:sp>
+        <p:nvSpPr>
+          <p:cNvPr id="2" name="Título 1">
+            <a:extLst>
+              <a:ext uri="{FF2B5EF4-FFF2-40B4-BE49-F238E27FC236}">
+                <a16:creationId xmlns:a16="http://schemas.microsoft.com/office/drawing/2014/main" id="{7507490D-5BDD-4618-A1A6-D7FAB932AB52}"/>
+              </a:ext>
+            </a:extLst>
+          </p:cNvPr>
+          <p:cNvSpPr>
+            <a:spLocks noGrp="1"/>
+          </p:cNvSpPr>
+          <p:nvPr>
+            <p:ph type="title"/>
+          </p:nvPr>
+        </p:nvSpPr>
+        <p:spPr/>
+        <p:txBody>
+          <a:bodyPr/>
+          <a:lstStyle/>
+          <a:p>
+            <a:r>
+              <a:rPr lang="es-AR"/>
+              <a:t>Escenarios de prueba</a:t>
+            </a:r>
+          </a:p>
+        </p:txBody>
+      </p:sp>
+      <p:sp>
+        <p:nvSpPr>
+          <p:cNvPr id="3" name="Marcador de contenido 2">
+            <a:extLst>
+              <a:ext uri="{FF2B5EF4-FFF2-40B4-BE49-F238E27FC236}">
+                <a16:creationId xmlns:a16="http://schemas.microsoft.com/office/drawing/2014/main" id="{72779C6A-3244-44BA-96D6-151D68706649}"/>
+              </a:ext>
+            </a:extLst>
+          </p:cNvPr>
+          <p:cNvSpPr>
+            <a:spLocks noGrp="1"/>
+          </p:cNvSpPr>
+          <p:nvPr>
+            <p:ph idx="1"/>
+          </p:nvPr>
+        </p:nvSpPr>
+        <p:spPr/>
+        <p:txBody>
+          <a:bodyPr/>
+          <a:lstStyle/>
+          <a:p>
+            <a:r>
+              <a:rPr lang="es-AR"/>
+              <a:t>Multithreading</a:t>
+            </a:r>
+          </a:p>
+          <a:p>
+            <a:r>
+              <a:rPr lang="es-AR"/>
+              <a:t>Multiproceso real</a:t>
+            </a:r>
+          </a:p>
+          <a:p>
+            <a:r>
+              <a:rPr lang="es-AR"/>
+              <a:t>Varios procesos a una tabla</a:t>
+            </a:r>
+          </a:p>
+          <a:p>
+            <a:r>
+              <a:rPr lang="es-AR"/>
+              <a:t>Cada proceso con su tabla</a:t>
+            </a:r>
+          </a:p>
+          <a:p>
+            <a:r>
+              <a:rPr lang="es-AR"/>
+              <a:t>Timeouts</a:t>
+            </a:r>
+          </a:p>
+          <a:p>
+            <a:endParaRPr lang="es-AR"/>
+          </a:p>
+        </p:txBody>
+      </p:sp>
+    </p:spTree>
+    <p:extLst>
+      <p:ext uri="{BB962C8B-B14F-4D97-AF65-F5344CB8AC3E}">
+        <p14:creationId xmlns:p14="http://schemas.microsoft.com/office/powerpoint/2010/main" val="1738228909"/>
       </p:ext>
     </p:extLst>
   </p:cSld>

</xml_diff>

<commit_message>
Genera Carga SQL y otros cambios
</commit_message>
<xml_diff>
--- a/Presentación MultiThreads.pptx
+++ b/Presentación MultiThreads.pptx
@@ -8,8 +8,9 @@
     <p:sldId id="256" r:id="rId2"/>
     <p:sldId id="257" r:id="rId3"/>
     <p:sldId id="259" r:id="rId4"/>
-    <p:sldId id="258" r:id="rId5"/>
-    <p:sldId id="260" r:id="rId6"/>
+    <p:sldId id="261" r:id="rId5"/>
+    <p:sldId id="258" r:id="rId6"/>
+    <p:sldId id="260" r:id="rId7"/>
   </p:sldIdLst>
   <p:sldSz cx="12192000" cy="6858000"/>
   <p:notesSz cx="6858000" cy="9144000"/>
@@ -119,7 +120,7 @@
 <file path=ppt/revisionInfo.xml><?xml version="1.0" encoding="utf-8"?>
 <p1510:revInfo xmlns:a="http://schemas.openxmlformats.org/drawingml/2006/main" xmlns:r="http://schemas.openxmlformats.org/officeDocument/2006/relationships" xmlns:p1510="http://schemas.microsoft.com/office/powerpoint/2015/10/main">
   <p1510:revLst>
-    <p1510:client id="{DE8E6EAE-F6CD-4785-A600-D922DB218087}" v="8" dt="2020-06-03T16:06:38.689"/>
+    <p1510:client id="{DE8E6EAE-F6CD-4785-A600-D922DB218087}" v="13" dt="2020-06-03T17:27:04.220"/>
   </p1510:revLst>
 </p1510:revInfo>
 </file>
@@ -129,7 +130,7 @@
   <pc:docChgLst>
     <pc:chgData name="Gaston Abalde" userId="c6fa59824ab3963e" providerId="LiveId" clId="{DE8E6EAE-F6CD-4785-A600-D922DB218087}"/>
     <pc:docChg chg="custSel addSld delSld modSld">
-      <pc:chgData name="Gaston Abalde" userId="c6fa59824ab3963e" providerId="LiveId" clId="{DE8E6EAE-F6CD-4785-A600-D922DB218087}" dt="2020-06-03T16:07:35.724" v="503" actId="20577"/>
+      <pc:chgData name="Gaston Abalde" userId="c6fa59824ab3963e" providerId="LiveId" clId="{DE8E6EAE-F6CD-4785-A600-D922DB218087}" dt="2020-06-03T17:28:26.256" v="554" actId="20577"/>
       <pc:docMkLst>
         <pc:docMk/>
       </pc:docMkLst>
@@ -219,7 +220,7 @@
         </pc:picChg>
       </pc:sldChg>
       <pc:sldChg chg="modSp add">
-        <pc:chgData name="Gaston Abalde" userId="c6fa59824ab3963e" providerId="LiveId" clId="{DE8E6EAE-F6CD-4785-A600-D922DB218087}" dt="2020-06-03T12:36:16.326" v="364" actId="20577"/>
+        <pc:chgData name="Gaston Abalde" userId="c6fa59824ab3963e" providerId="LiveId" clId="{DE8E6EAE-F6CD-4785-A600-D922DB218087}" dt="2020-06-03T17:28:26.256" v="554" actId="20577"/>
         <pc:sldMkLst>
           <pc:docMk/>
           <pc:sldMk cId="1466474985" sldId="259"/>
@@ -233,7 +234,7 @@
           </ac:spMkLst>
         </pc:spChg>
         <pc:spChg chg="mod">
-          <ac:chgData name="Gaston Abalde" userId="c6fa59824ab3963e" providerId="LiveId" clId="{DE8E6EAE-F6CD-4785-A600-D922DB218087}" dt="2020-06-03T12:36:16.326" v="364" actId="20577"/>
+          <ac:chgData name="Gaston Abalde" userId="c6fa59824ab3963e" providerId="LiveId" clId="{DE8E6EAE-F6CD-4785-A600-D922DB218087}" dt="2020-06-03T17:28:26.256" v="554" actId="20577"/>
           <ac:spMkLst>
             <pc:docMk/>
             <pc:sldMk cId="1466474985" sldId="259"/>
@@ -270,6 +271,29 @@
           <pc:docMk/>
           <pc:sldMk cId="2351841552" sldId="260"/>
         </pc:sldMkLst>
+      </pc:sldChg>
+      <pc:sldChg chg="modSp add">
+        <pc:chgData name="Gaston Abalde" userId="c6fa59824ab3963e" providerId="LiveId" clId="{DE8E6EAE-F6CD-4785-A600-D922DB218087}" dt="2020-06-03T17:27:09.699" v="520" actId="6549"/>
+        <pc:sldMkLst>
+          <pc:docMk/>
+          <pc:sldMk cId="4123676817" sldId="261"/>
+        </pc:sldMkLst>
+        <pc:spChg chg="mod">
+          <ac:chgData name="Gaston Abalde" userId="c6fa59824ab3963e" providerId="LiveId" clId="{DE8E6EAE-F6CD-4785-A600-D922DB218087}" dt="2020-06-03T17:27:07.271" v="519" actId="20577"/>
+          <ac:spMkLst>
+            <pc:docMk/>
+            <pc:sldMk cId="4123676817" sldId="261"/>
+            <ac:spMk id="2" creationId="{833E3F9F-1DBC-41C6-B66C-F2E5FCA87D20}"/>
+          </ac:spMkLst>
+        </pc:spChg>
+        <pc:spChg chg="mod">
+          <ac:chgData name="Gaston Abalde" userId="c6fa59824ab3963e" providerId="LiveId" clId="{DE8E6EAE-F6CD-4785-A600-D922DB218087}" dt="2020-06-03T17:27:09.699" v="520" actId="6549"/>
+          <ac:spMkLst>
+            <pc:docMk/>
+            <pc:sldMk cId="4123676817" sldId="261"/>
+            <ac:spMk id="3" creationId="{658322C1-F971-42E0-8BFA-4B064DC14AFF}"/>
+          </ac:spMkLst>
+        </pc:spChg>
       </pc:sldChg>
     </pc:docChg>
   </pc:docChgLst>
@@ -3735,7 +3759,9 @@
         </p:nvSpPr>
         <p:spPr/>
         <p:txBody>
-          <a:bodyPr/>
+          <a:bodyPr>
+            <a:normAutofit lnSpcReduction="10000"/>
+          </a:bodyPr>
           <a:lstStyle/>
           <a:p>
             <a:r>
@@ -3765,6 +3791,18 @@
             <a:r>
               <a:rPr lang="es-AR"/>
               <a:t>SQL Management Studio</a:t>
+            </a:r>
+          </a:p>
+          <a:p>
+            <a:r>
+              <a:rPr lang="es-AR"/>
+              <a:t>SQL Profiler</a:t>
+            </a:r>
+          </a:p>
+          <a:p>
+            <a:r>
+              <a:rPr lang="es-AR"/>
+              <a:t>Performance Monitor</a:t>
             </a:r>
           </a:p>
           <a:p>
@@ -3795,6 +3833,112 @@
 </file>
 
 <file path=ppt/slides/slide4.xml><?xml version="1.0" encoding="utf-8"?>
+<p:sld xmlns:a="http://schemas.openxmlformats.org/drawingml/2006/main" xmlns:r="http://schemas.openxmlformats.org/officeDocument/2006/relationships" xmlns:p="http://schemas.openxmlformats.org/presentationml/2006/main">
+  <p:cSld>
+    <p:spTree>
+      <p:nvGrpSpPr>
+        <p:cNvPr id="1" name=""/>
+        <p:cNvGrpSpPr/>
+        <p:nvPr/>
+      </p:nvGrpSpPr>
+      <p:grpSpPr>
+        <a:xfrm>
+          <a:off x="0" y="0"/>
+          <a:ext cx="0" cy="0"/>
+          <a:chOff x="0" y="0"/>
+          <a:chExt cx="0" cy="0"/>
+        </a:xfrm>
+      </p:grpSpPr>
+      <p:sp>
+        <p:nvSpPr>
+          <p:cNvPr id="2" name="Título 1">
+            <a:extLst>
+              <a:ext uri="{FF2B5EF4-FFF2-40B4-BE49-F238E27FC236}">
+                <a16:creationId xmlns:a16="http://schemas.microsoft.com/office/drawing/2014/main" id="{833E3F9F-1DBC-41C6-B66C-F2E5FCA87D20}"/>
+              </a:ext>
+            </a:extLst>
+          </p:cNvPr>
+          <p:cNvSpPr>
+            <a:spLocks noGrp="1"/>
+          </p:cNvSpPr>
+          <p:nvPr>
+            <p:ph type="title"/>
+          </p:nvPr>
+        </p:nvSpPr>
+        <p:spPr/>
+        <p:txBody>
+          <a:bodyPr/>
+          <a:lstStyle/>
+          <a:p>
+            <a:r>
+              <a:rPr lang="es-AR"/>
+              <a:t>Librerías</a:t>
+            </a:r>
+          </a:p>
+        </p:txBody>
+      </p:sp>
+      <p:sp>
+        <p:nvSpPr>
+          <p:cNvPr id="3" name="Marcador de contenido 2">
+            <a:extLst>
+              <a:ext uri="{FF2B5EF4-FFF2-40B4-BE49-F238E27FC236}">
+                <a16:creationId xmlns:a16="http://schemas.microsoft.com/office/drawing/2014/main" id="{658322C1-F971-42E0-8BFA-4B064DC14AFF}"/>
+              </a:ext>
+            </a:extLst>
+          </p:cNvPr>
+          <p:cNvSpPr>
+            <a:spLocks noGrp="1"/>
+          </p:cNvSpPr>
+          <p:nvPr>
+            <p:ph idx="1"/>
+          </p:nvPr>
+        </p:nvSpPr>
+        <p:spPr/>
+        <p:txBody>
+          <a:bodyPr/>
+          <a:lstStyle/>
+          <a:p>
+            <a:r>
+              <a:rPr lang="en-US"/>
+              <a:t>import pyodbc</a:t>
+            </a:r>
+          </a:p>
+          <a:p>
+            <a:r>
+              <a:rPr lang="en-US"/>
+              <a:t>import time</a:t>
+            </a:r>
+          </a:p>
+          <a:p>
+            <a:r>
+              <a:rPr lang="es-AR"/>
+              <a:t>from threading import Thread</a:t>
+            </a:r>
+            <a:endParaRPr lang="en-US"/>
+          </a:p>
+          <a:p>
+            <a:r>
+              <a:rPr lang="en-US"/>
+              <a:t>from multiprocessing import Pool</a:t>
+            </a:r>
+            <a:endParaRPr lang="es-AR"/>
+          </a:p>
+        </p:txBody>
+      </p:sp>
+    </p:spTree>
+    <p:extLst>
+      <p:ext uri="{BB962C8B-B14F-4D97-AF65-F5344CB8AC3E}">
+        <p14:creationId xmlns:p14="http://schemas.microsoft.com/office/powerpoint/2010/main" val="4123676817"/>
+      </p:ext>
+    </p:extLst>
+  </p:cSld>
+  <p:clrMapOvr>
+    <a:masterClrMapping/>
+  </p:clrMapOvr>
+</p:sld>
+</file>
+
+<file path=ppt/slides/slide5.xml><?xml version="1.0" encoding="utf-8"?>
 <p:sld xmlns:a="http://schemas.openxmlformats.org/drawingml/2006/main" xmlns:r="http://schemas.openxmlformats.org/officeDocument/2006/relationships" xmlns:p="http://schemas.openxmlformats.org/presentationml/2006/main">
   <p:cSld>
     <p:spTree>
@@ -3884,7 +4028,7 @@
 </p:sld>
 </file>
 
-<file path=ppt/slides/slide5.xml><?xml version="1.0" encoding="utf-8"?>
+<file path=ppt/slides/slide6.xml><?xml version="1.0" encoding="utf-8"?>
 <p:sld xmlns:a="http://schemas.openxmlformats.org/drawingml/2006/main" xmlns:r="http://schemas.openxmlformats.org/officeDocument/2006/relationships" xmlns:p="http://schemas.openxmlformats.org/presentationml/2006/main">
   <p:cSld>
     <p:spTree>

</xml_diff>